<commit_message>
Filter Should be working
</commit_message>
<xml_diff>
--- a/output.pptx
+++ b/output.pptx
@@ -4,9 +4,6 @@
   <p:sldMasterIdLst>
     <p:sldMasterId id="2147483648" r:id="rId1"/>
   </p:sldMasterIdLst>
-  <p:sldIdLst>
-    <p:sldId id="256" r:id="rId7"/>
-  </p:sldIdLst>
   <p:sldSz cx="9144000" cy="6858000" type="screen4x3"/>
   <p:notesSz cx="6858000" cy="9144000"/>
   <p:defaultTextStyle>
@@ -3076,107 +3073,6 @@
     </p:otherStyle>
   </p:txStyles>
 </p:sldMaster>
-</file>
-
-<file path=ppt/slides/slide1.xml><?xml version="1.0" encoding="utf-8"?>
-<p:sld xmlns:a="http://schemas.openxmlformats.org/drawingml/2006/main" xmlns:p="http://schemas.openxmlformats.org/presentationml/2006/main" xmlns:r="http://schemas.openxmlformats.org/officeDocument/2006/relationships">
-  <p:cSld>
-    <p:spTree>
-      <p:nvGrpSpPr>
-        <p:cNvPr id="1" name=""/>
-        <p:cNvGrpSpPr/>
-        <p:nvPr/>
-      </p:nvGrpSpPr>
-      <p:grpSpPr/>
-      <p:sp>
-        <p:nvSpPr>
-          <p:cNvPr id="2" name="TextBox 1"/>
-          <p:cNvSpPr txBox="1"/>
-          <p:nvPr/>
-        </p:nvSpPr>
-        <p:spPr>
-          <a:xfrm>
-            <a:off x="0" y="0"/>
-            <a:ext cx="9144000" cy="685800"/>
-          </a:xfrm>
-          <a:prstGeom prst="rect">
-            <a:avLst/>
-          </a:prstGeom>
-          <a:solidFill>
-            <a:srgbClr val="000000"/>
-          </a:solidFill>
-        </p:spPr>
-        <p:txBody>
-          <a:bodyPr wrap="square" lIns="127000" rIns="127000" tIns="38100" bIns="38100">
-            <a:normAutofit/>
-          </a:bodyPr>
-          <a:lstStyle/>
-          <a:p/>
-          <a:p>
-            <a:pPr>
-              <a:defRPr sz="2000">
-                <a:solidFill>
-                  <a:srgbClr val="FFFFFF"/>
-                </a:solidFill>
-                <a:latin typeface="Inter"/>
-              </a:defRPr>
-            </a:pPr>
-            <a:r>
-              <a:t>RUST</a:t>
-            </a:r>
-          </a:p>
-        </p:txBody>
-      </p:sp>
-      <p:sp>
-        <p:nvSpPr>
-          <p:cNvPr id="3" name="TextBox 2"/>
-          <p:cNvSpPr txBox="1"/>
-          <p:nvPr/>
-        </p:nvSpPr>
-        <p:spPr>
-          <a:xfrm>
-            <a:off x="762000" y="857250"/>
-            <a:ext cx="7315200" cy="6858000"/>
-          </a:xfrm>
-          <a:prstGeom prst="rect">
-            <a:avLst/>
-          </a:prstGeom>
-          <a:noFill/>
-        </p:spPr>
-        <p:txBody>
-          <a:bodyPr wrap="square">
-            <a:spAutoFit/>
-          </a:bodyPr>
-          <a:lstStyle/>
-          <a:p/>
-          <a:p>
-            <a:pPr>
-              <a:defRPr sz="1800">
-                <a:latin typeface="Inter"/>
-              </a:defRPr>
-            </a:pPr>
-            <a:r>
-              <a:t>A ds c 2dwdwdw</a:t>
-            </a:r>
-          </a:p>
-          <a:p>
-            <a:pPr>
-              <a:defRPr sz="1800">
-                <a:latin typeface="Inter"/>
-              </a:defRPr>
-            </a:pPr>
-            <a:r>
-              <a:t>Hello F sd z</a:t>
-            </a:r>
-          </a:p>
-        </p:txBody>
-      </p:sp>
-    </p:spTree>
-  </p:cSld>
-  <p:clrMapOvr>
-    <a:masterClrMapping/>
-  </p:clrMapOvr>
-</p:sld>
 </file>
 
 <file path=ppt/theme/theme1.xml><?xml version="1.0" encoding="utf-8"?>

</xml_diff>

<commit_message>
fix image ppt layout
</commit_message>
<xml_diff>
--- a/output.pptx
+++ b/output.pptx
@@ -10,6 +10,9 @@
     <p:sldId id="258" r:id="rId9"/>
     <p:sldId id="259" r:id="rId10"/>
     <p:sldId id="260" r:id="rId11"/>
+    <p:sldId id="261" r:id="rId12"/>
+    <p:sldId id="262" r:id="rId13"/>
+    <p:sldId id="263" r:id="rId14"/>
   </p:sldIdLst>
   <p:sldSz cx="9144000" cy="6858000" type="screen4x3"/>
   <p:notesSz cx="6858000" cy="9144000"/>
@@ -3113,7 +3116,7 @@
               </a:defRPr>
             </a:pPr>
             <a:r>
-              <a:t>RUST</a:t>
+              <a:t>PyPI Installation Guide</a:t>
             </a:r>
           </a:p>
         </p:txBody>
@@ -3139,7 +3142,7 @@
               </a:defRPr>
             </a:pPr>
             <a:r>
-              <a:t>A Type-safe programming language</a:t>
+              <a:t>Basic instruction</a:t>
             </a:r>
           </a:p>
         </p:txBody>
@@ -3195,7 +3198,7 @@
               </a:defRPr>
             </a:pPr>
             <a:r>
-              <a:t>RUST</a:t>
+              <a:t>PyPI Installation Guide</a:t>
             </a:r>
           </a:p>
         </p:txBody>
@@ -3222,24 +3225,11 @@
           </a:bodyPr>
           <a:lstStyle/>
           <a:p/>
-          <a:p>
-            <a:pPr>
-              <a:spcAft>
-                <a:spcPts val="1800"/>
-              </a:spcAft>
-              <a:defRPr sz="1800">
-                <a:latin typeface="Inter"/>
-              </a:defRPr>
-            </a:pPr>
-            <a:r>
-              <a:t>The document is broken down into sections so that readers may easily skips parts of the process they are already familiar with.  All but the final section (Uploading to PyPI), can be undertaken as an exercise to understand Python packaging and test the process, without publishing a package on the formal PyPI distribution. For a more detailed reference on package creation, see the official Python Packaging Authority (PyPA) website.</a:t>
-            </a:r>
-          </a:p>
         </p:txBody>
       </p:sp>
       <p:pic>
         <p:nvPicPr>
-          <p:cNvPr id="4" name="Picture 3" descr="Image22.52.jpg"/>
+          <p:cNvPr id="4" name="Picture 3" descr="Image22.84.jpg"/>
           <p:cNvPicPr>
             <a:picLocks noChangeAspect="1"/>
           </p:cNvPicPr>
@@ -3253,8 +3243,8 @@
         </p:blipFill>
         <p:spPr>
           <a:xfrm>
-            <a:off x="2286000" y="4114800"/>
-            <a:ext cx="2061148" cy="1371600"/>
+            <a:off x="2286000" y="1714500"/>
+            <a:ext cx="5152869" cy="3429000"/>
           </a:xfrm>
           <a:prstGeom prst="rect">
             <a:avLst/>
@@ -3312,7 +3302,7 @@
               </a:defRPr>
             </a:pPr>
             <a:r>
-              <a:t>RUST</a:t>
+              <a:t>PyPI Installation Guide</a:t>
             </a:r>
           </a:p>
         </p:txBody>
@@ -3339,21 +3329,32 @@
           </a:bodyPr>
           <a:lstStyle/>
           <a:p/>
-          <a:p>
-            <a:pPr>
-              <a:spcAft>
-                <a:spcPts val="1800"/>
-              </a:spcAft>
-              <a:defRPr sz="1800">
-                <a:latin typeface="Inter"/>
-              </a:defRPr>
-            </a:pPr>
-            <a:r>
-              <a:t>Note: PyPI should be pronounced “pie P I” to avoid confusion with pypy (a Python implementation).</a:t>
-            </a:r>
-          </a:p>
-        </p:txBody>
-      </p:sp>
+        </p:txBody>
+      </p:sp>
+      <p:pic>
+        <p:nvPicPr>
+          <p:cNvPr id="4" name="Picture 3" descr="Image22.84.jpg"/>
+          <p:cNvPicPr>
+            <a:picLocks noChangeAspect="1"/>
+          </p:cNvPicPr>
+          <p:nvPr/>
+        </p:nvPicPr>
+        <p:blipFill>
+          <a:blip r:embed="rId2"/>
+          <a:stretch>
+            <a:fillRect/>
+          </a:stretch>
+        </p:blipFill>
+        <p:spPr>
+          <a:xfrm>
+            <a:off x="2286000" y="1714500"/>
+            <a:ext cx="5152869" cy="3429000"/>
+          </a:xfrm>
+          <a:prstGeom prst="rect">
+            <a:avLst/>
+          </a:prstGeom>
+        </p:spPr>
+      </p:pic>
     </p:spTree>
   </p:cSld>
   <p:clrMapOvr>
@@ -3405,7 +3406,7 @@
               </a:defRPr>
             </a:pPr>
             <a:r>
-              <a:t>RUST</a:t>
+              <a:t>PyPI Installation Guide</a:t>
             </a:r>
           </a:p>
         </p:txBody>
@@ -3432,37 +3433,11 @@
           </a:bodyPr>
           <a:lstStyle/>
           <a:p/>
-          <a:p>
-            <a:pPr>
-              <a:spcAft>
-                <a:spcPts val="1800"/>
-              </a:spcAft>
-              <a:defRPr sz="1800">
-                <a:latin typeface="Inter"/>
-              </a:defRPr>
-            </a:pPr>
-            <a:r>
-              <a:t>The package can now be imported in Python scripts.  You may need to run as sudo if you have root privileges, or append --user to install under your home directory (often this will be under $HOME/. local).</a:t>
-            </a:r>
-          </a:p>
-          <a:p>
-            <a:pPr>
-              <a:spcAft>
-                <a:spcPts val="1800"/>
-              </a:spcAft>
-              <a:defRPr sz="1800">
-                <a:latin typeface="Inter"/>
-              </a:defRPr>
-            </a:pPr>
-            <a:r>
-              <a:t>Note: pip3 is used to install Python3 packages, however in some environments the command pip may point to pip3, just as python may point to Python3.  You can use which pip to check this.  For this document, examples will show the command simply as pip.</a:t>
-            </a:r>
-          </a:p>
         </p:txBody>
       </p:sp>
       <p:pic>
         <p:nvPicPr>
-          <p:cNvPr id="4" name="Picture 3" descr="Image23.52.jpg"/>
+          <p:cNvPr id="4" name="Picture 3" descr="Image22.84.jpg"/>
           <p:cNvPicPr>
             <a:picLocks noChangeAspect="1"/>
           </p:cNvPicPr>
@@ -3476,8 +3451,8 @@
         </p:blipFill>
         <p:spPr>
           <a:xfrm>
-            <a:off x="2286000" y="4114800"/>
-            <a:ext cx="1459149" cy="1371600"/>
+            <a:off x="2286000" y="1714500"/>
+            <a:ext cx="5152869" cy="3429000"/>
           </a:xfrm>
           <a:prstGeom prst="rect">
             <a:avLst/>
@@ -3535,7 +3510,7 @@
               </a:defRPr>
             </a:pPr>
             <a:r>
-              <a:t>RUST</a:t>
+              <a:t>PyPI Installation Guide</a:t>
             </a:r>
           </a:p>
         </p:txBody>
@@ -3562,6 +3537,320 @@
           </a:bodyPr>
           <a:lstStyle/>
           <a:p/>
+        </p:txBody>
+      </p:sp>
+      <p:pic>
+        <p:nvPicPr>
+          <p:cNvPr id="4" name="Picture 3" descr="Image22.84.jpg"/>
+          <p:cNvPicPr>
+            <a:picLocks noChangeAspect="1"/>
+          </p:cNvPicPr>
+          <p:nvPr/>
+        </p:nvPicPr>
+        <p:blipFill>
+          <a:blip r:embed="rId2"/>
+          <a:stretch>
+            <a:fillRect/>
+          </a:stretch>
+        </p:blipFill>
+        <p:spPr>
+          <a:xfrm>
+            <a:off x="2286000" y="1714500"/>
+            <a:ext cx="5152869" cy="3429000"/>
+          </a:xfrm>
+          <a:prstGeom prst="rect">
+            <a:avLst/>
+          </a:prstGeom>
+        </p:spPr>
+      </p:pic>
+    </p:spTree>
+  </p:cSld>
+  <p:clrMapOvr>
+    <a:masterClrMapping/>
+  </p:clrMapOvr>
+</p:sld>
+</file>
+
+<file path=ppt/slides/slide6.xml><?xml version="1.0" encoding="utf-8"?>
+<p:sld xmlns:a="http://schemas.openxmlformats.org/drawingml/2006/main" xmlns:p="http://schemas.openxmlformats.org/presentationml/2006/main" xmlns:r="http://schemas.openxmlformats.org/officeDocument/2006/relationships">
+  <p:cSld>
+    <p:spTree>
+      <p:nvGrpSpPr>
+        <p:cNvPr id="1" name=""/>
+        <p:cNvGrpSpPr/>
+        <p:nvPr/>
+      </p:nvGrpSpPr>
+      <p:grpSpPr/>
+      <p:sp>
+        <p:nvSpPr>
+          <p:cNvPr id="2" name="TextBox 1"/>
+          <p:cNvSpPr txBox="1"/>
+          <p:nvPr/>
+        </p:nvSpPr>
+        <p:spPr>
+          <a:xfrm>
+            <a:off x="0" y="0"/>
+            <a:ext cx="9144000" cy="381000"/>
+          </a:xfrm>
+          <a:prstGeom prst="rect">
+            <a:avLst/>
+          </a:prstGeom>
+          <a:solidFill>
+            <a:srgbClr val="000000"/>
+          </a:solidFill>
+        </p:spPr>
+        <p:txBody>
+          <a:bodyPr wrap="square">
+            <a:spAutoFit/>
+          </a:bodyPr>
+          <a:lstStyle/>
+          <a:p>
+            <a:pPr>
+              <a:defRPr sz="2000">
+                <a:solidFill>
+                  <a:srgbClr val="FFFFFF"/>
+                </a:solidFill>
+                <a:latin typeface="Inter"/>
+              </a:defRPr>
+            </a:pPr>
+            <a:r>
+              <a:t>PyPI Installation Guide</a:t>
+            </a:r>
+          </a:p>
+        </p:txBody>
+      </p:sp>
+      <p:sp>
+        <p:nvSpPr>
+          <p:cNvPr id="3" name="TextBox 2"/>
+          <p:cNvSpPr txBox="1"/>
+          <p:nvPr/>
+        </p:nvSpPr>
+        <p:spPr>
+          <a:xfrm>
+            <a:off x="914400" y="1143000"/>
+            <a:ext cx="7315200" cy="0"/>
+          </a:xfrm>
+          <a:prstGeom prst="rect">
+            <a:avLst/>
+          </a:prstGeom>
+          <a:noFill/>
+        </p:spPr>
+        <p:txBody>
+          <a:bodyPr wrap="square">
+            <a:spAutoFit/>
+          </a:bodyPr>
+          <a:lstStyle/>
+          <a:p/>
+          <a:p>
+            <a:pPr>
+              <a:spcAft>
+                <a:spcPts val="1800"/>
+              </a:spcAft>
+              <a:defRPr sz="1800">
+                <a:latin typeface="Inter"/>
+              </a:defRPr>
+            </a:pPr>
+            <a:r>
+              <a:t>The document is broken down into sections so that readers may easily skips parts of the process they are already familiar with.  All but the final section (Uploading to PyPI), can be undertaken as an exercise to understand Python packaging and test the process, without publishing a package on the formal PyPI distribution. For a more detailed reference on package creation, see the official Python Packaging Authority (PyPA) website.  Note: PyPI should be pronounced “pie P I” to avoid confusion with pypy (a Python implementation).  The package can now be imported in Python scripts.  You may need to run as sudo if you have root privileges, or append --user to install under your home directory (often this will be under $HOME/. local).</a:t>
+            </a:r>
+          </a:p>
+        </p:txBody>
+      </p:sp>
+    </p:spTree>
+  </p:cSld>
+  <p:clrMapOvr>
+    <a:masterClrMapping/>
+  </p:clrMapOvr>
+</p:sld>
+</file>
+
+<file path=ppt/slides/slide7.xml><?xml version="1.0" encoding="utf-8"?>
+<p:sld xmlns:a="http://schemas.openxmlformats.org/drawingml/2006/main" xmlns:p="http://schemas.openxmlformats.org/presentationml/2006/main" xmlns:r="http://schemas.openxmlformats.org/officeDocument/2006/relationships">
+  <p:cSld>
+    <p:spTree>
+      <p:nvGrpSpPr>
+        <p:cNvPr id="1" name=""/>
+        <p:cNvGrpSpPr/>
+        <p:nvPr/>
+      </p:nvGrpSpPr>
+      <p:grpSpPr/>
+      <p:sp>
+        <p:nvSpPr>
+          <p:cNvPr id="2" name="TextBox 1"/>
+          <p:cNvSpPr txBox="1"/>
+          <p:nvPr/>
+        </p:nvSpPr>
+        <p:spPr>
+          <a:xfrm>
+            <a:off x="0" y="0"/>
+            <a:ext cx="9144000" cy="381000"/>
+          </a:xfrm>
+          <a:prstGeom prst="rect">
+            <a:avLst/>
+          </a:prstGeom>
+          <a:solidFill>
+            <a:srgbClr val="000000"/>
+          </a:solidFill>
+        </p:spPr>
+        <p:txBody>
+          <a:bodyPr wrap="square">
+            <a:spAutoFit/>
+          </a:bodyPr>
+          <a:lstStyle/>
+          <a:p>
+            <a:pPr>
+              <a:defRPr sz="2000">
+                <a:solidFill>
+                  <a:srgbClr val="FFFFFF"/>
+                </a:solidFill>
+                <a:latin typeface="Inter"/>
+              </a:defRPr>
+            </a:pPr>
+            <a:r>
+              <a:t>PyPI Installation Guide</a:t>
+            </a:r>
+          </a:p>
+        </p:txBody>
+      </p:sp>
+      <p:sp>
+        <p:nvSpPr>
+          <p:cNvPr id="3" name="TextBox 2"/>
+          <p:cNvSpPr txBox="1"/>
+          <p:nvPr/>
+        </p:nvSpPr>
+        <p:spPr>
+          <a:xfrm>
+            <a:off x="914400" y="1143000"/>
+            <a:ext cx="7315200" cy="0"/>
+          </a:xfrm>
+          <a:prstGeom prst="rect">
+            <a:avLst/>
+          </a:prstGeom>
+          <a:noFill/>
+        </p:spPr>
+        <p:txBody>
+          <a:bodyPr wrap="square">
+            <a:spAutoFit/>
+          </a:bodyPr>
+          <a:lstStyle/>
+          <a:p/>
+        </p:txBody>
+      </p:sp>
+      <p:pic>
+        <p:nvPicPr>
+          <p:cNvPr id="4" name="Picture 3" descr="Image23.75.jpg"/>
+          <p:cNvPicPr>
+            <a:picLocks noChangeAspect="1"/>
+          </p:cNvPicPr>
+          <p:nvPr/>
+        </p:nvPicPr>
+        <p:blipFill>
+          <a:blip r:embed="rId2"/>
+          <a:stretch>
+            <a:fillRect/>
+          </a:stretch>
+        </p:blipFill>
+        <p:spPr>
+          <a:xfrm>
+            <a:off x="2286000" y="1714500"/>
+            <a:ext cx="5308050" cy="3429000"/>
+          </a:xfrm>
+          <a:prstGeom prst="rect">
+            <a:avLst/>
+          </a:prstGeom>
+        </p:spPr>
+      </p:pic>
+    </p:spTree>
+  </p:cSld>
+  <p:clrMapOvr>
+    <a:masterClrMapping/>
+  </p:clrMapOvr>
+</p:sld>
+</file>
+
+<file path=ppt/slides/slide8.xml><?xml version="1.0" encoding="utf-8"?>
+<p:sld xmlns:a="http://schemas.openxmlformats.org/drawingml/2006/main" xmlns:p="http://schemas.openxmlformats.org/presentationml/2006/main" xmlns:r="http://schemas.openxmlformats.org/officeDocument/2006/relationships">
+  <p:cSld>
+    <p:spTree>
+      <p:nvGrpSpPr>
+        <p:cNvPr id="1" name=""/>
+        <p:cNvGrpSpPr/>
+        <p:nvPr/>
+      </p:nvGrpSpPr>
+      <p:grpSpPr/>
+      <p:sp>
+        <p:nvSpPr>
+          <p:cNvPr id="2" name="TextBox 1"/>
+          <p:cNvSpPr txBox="1"/>
+          <p:nvPr/>
+        </p:nvSpPr>
+        <p:spPr>
+          <a:xfrm>
+            <a:off x="0" y="0"/>
+            <a:ext cx="9144000" cy="381000"/>
+          </a:xfrm>
+          <a:prstGeom prst="rect">
+            <a:avLst/>
+          </a:prstGeom>
+          <a:solidFill>
+            <a:srgbClr val="000000"/>
+          </a:solidFill>
+        </p:spPr>
+        <p:txBody>
+          <a:bodyPr wrap="square">
+            <a:spAutoFit/>
+          </a:bodyPr>
+          <a:lstStyle/>
+          <a:p>
+            <a:pPr>
+              <a:defRPr sz="2000">
+                <a:solidFill>
+                  <a:srgbClr val="FFFFFF"/>
+                </a:solidFill>
+                <a:latin typeface="Inter"/>
+              </a:defRPr>
+            </a:pPr>
+            <a:r>
+              <a:t>PyPI Installation Guide</a:t>
+            </a:r>
+          </a:p>
+        </p:txBody>
+      </p:sp>
+      <p:sp>
+        <p:nvSpPr>
+          <p:cNvPr id="3" name="TextBox 2"/>
+          <p:cNvSpPr txBox="1"/>
+          <p:nvPr/>
+        </p:nvSpPr>
+        <p:spPr>
+          <a:xfrm>
+            <a:off x="914400" y="1143000"/>
+            <a:ext cx="7315200" cy="0"/>
+          </a:xfrm>
+          <a:prstGeom prst="rect">
+            <a:avLst/>
+          </a:prstGeom>
+          <a:noFill/>
+        </p:spPr>
+        <p:txBody>
+          <a:bodyPr wrap="square">
+            <a:spAutoFit/>
+          </a:bodyPr>
+          <a:lstStyle/>
+          <a:p/>
+          <a:p>
+            <a:pPr>
+              <a:spcAft>
+                <a:spcPts val="1800"/>
+              </a:spcAft>
+              <a:defRPr sz="1800">
+                <a:latin typeface="Inter"/>
+              </a:defRPr>
+            </a:pPr>
+            <a:r>
+              <a:t>Note: pip3 is used to install Python3 packages, however in some environments the command pip may point to pip3, just as python may point to Python3.  You can use which pip to check this.  For this document, examples will show the command simply as pip.</a:t>
+            </a:r>
+          </a:p>
         </p:txBody>
       </p:sp>
     </p:spTree>

</xml_diff>

<commit_message>
wrap the main function
</commit_message>
<xml_diff>
--- a/output.pptx
+++ b/output.pptx
@@ -13,6 +13,9 @@
     <p:sldId id="261" r:id="rId12"/>
     <p:sldId id="262" r:id="rId13"/>
     <p:sldId id="263" r:id="rId14"/>
+    <p:sldId id="264" r:id="rId15"/>
+    <p:sldId id="265" r:id="rId16"/>
+    <p:sldId id="266" r:id="rId17"/>
   </p:sldIdLst>
   <p:sldSz cx="9144000" cy="6858000" type="screen4x3"/>
   <p:notesSz cx="6858000" cy="9144000"/>
@@ -3112,11 +3115,11 @@
           <a:p>
             <a:pPr>
               <a:defRPr>
-                <a:latin typeface="Inter"/>
+                <a:latin typeface="Calibri"/>
               </a:defRPr>
             </a:pPr>
             <a:r>
-              <a:t>PyPI Installation Guide</a:t>
+              <a:t>CAT VERY FRIENDLY GUIDE</a:t>
             </a:r>
           </a:p>
         </p:txBody>
@@ -3138,11 +3141,197 @@
           <a:p>
             <a:pPr>
               <a:defRPr>
-                <a:latin typeface="Inter"/>
+                <a:latin typeface="Calibri"/>
               </a:defRPr>
             </a:pPr>
             <a:r>
-              <a:t>Basic instruction</a:t>
+              <a:t>Make Your Cat Get Used To A New Environment</a:t>
+            </a:r>
+          </a:p>
+        </p:txBody>
+      </p:sp>
+    </p:spTree>
+  </p:cSld>
+  <p:clrMapOvr>
+    <a:masterClrMapping/>
+  </p:clrMapOvr>
+</p:sld>
+</file>
+
+<file path=ppt/slides/slide10.xml><?xml version="1.0" encoding="utf-8"?>
+<p:sld xmlns:a="http://schemas.openxmlformats.org/drawingml/2006/main" xmlns:p="http://schemas.openxmlformats.org/presentationml/2006/main" xmlns:r="http://schemas.openxmlformats.org/officeDocument/2006/relationships">
+  <p:cSld>
+    <p:spTree>
+      <p:nvGrpSpPr>
+        <p:cNvPr id="1" name=""/>
+        <p:cNvGrpSpPr/>
+        <p:nvPr/>
+      </p:nvGrpSpPr>
+      <p:grpSpPr/>
+      <p:sp>
+        <p:nvSpPr>
+          <p:cNvPr id="2" name="TextBox 1"/>
+          <p:cNvSpPr txBox="1"/>
+          <p:nvPr/>
+        </p:nvSpPr>
+        <p:spPr>
+          <a:xfrm>
+            <a:off x="0" y="0"/>
+            <a:ext cx="9144000" cy="381000"/>
+          </a:xfrm>
+          <a:prstGeom prst="rect">
+            <a:avLst/>
+          </a:prstGeom>
+          <a:solidFill>
+            <a:srgbClr val="000000"/>
+          </a:solidFill>
+        </p:spPr>
+        <p:txBody>
+          <a:bodyPr wrap="square">
+            <a:spAutoFit/>
+          </a:bodyPr>
+          <a:lstStyle/>
+          <a:p>
+            <a:pPr>
+              <a:defRPr sz="2000">
+                <a:solidFill>
+                  <a:srgbClr val="FFFFFF"/>
+                </a:solidFill>
+                <a:latin typeface="Calibri"/>
+              </a:defRPr>
+            </a:pPr>
+            <a:r>
+              <a:t>CAT VERY FRIENDLY GUIDE</a:t>
+            </a:r>
+          </a:p>
+        </p:txBody>
+      </p:sp>
+      <p:sp>
+        <p:nvSpPr>
+          <p:cNvPr id="3" name="TextBox 2"/>
+          <p:cNvSpPr txBox="1"/>
+          <p:nvPr/>
+        </p:nvSpPr>
+        <p:spPr>
+          <a:xfrm>
+            <a:off x="914400" y="1143000"/>
+            <a:ext cx="7315200" cy="0"/>
+          </a:xfrm>
+          <a:prstGeom prst="rect">
+            <a:avLst/>
+          </a:prstGeom>
+          <a:noFill/>
+        </p:spPr>
+        <p:txBody>
+          <a:bodyPr wrap="square">
+            <a:spAutoFit/>
+          </a:bodyPr>
+          <a:lstStyle/>
+          <a:p/>
+          <a:p>
+            <a:pPr>
+              <a:spcAft>
+                <a:spcPts val="1800"/>
+              </a:spcAft>
+              <a:defRPr sz="1800">
+                <a:latin typeface="Calibri"/>
+              </a:defRPr>
+            </a:pPr>
+            <a:r>
+              <a:t>Some cats like to stay in a safe room for weeks; others like to explore your house after a few days.  At first, you can allow your cat to travel around the house for 20 to 30 minutes and then take it back to its safe room.  After a few weeks, increase the amount of time out of the safe room, and then put them back away when you can’t supervise them.  If your cat is not adjusting to your home after a few weeks, talk to your vet and find the possible solution available to make the transition process easier.</a:t>
+            </a:r>
+          </a:p>
+        </p:txBody>
+      </p:sp>
+    </p:spTree>
+  </p:cSld>
+  <p:clrMapOvr>
+    <a:masterClrMapping/>
+  </p:clrMapOvr>
+</p:sld>
+</file>
+
+<file path=ppt/slides/slide11.xml><?xml version="1.0" encoding="utf-8"?>
+<p:sld xmlns:a="http://schemas.openxmlformats.org/drawingml/2006/main" xmlns:p="http://schemas.openxmlformats.org/presentationml/2006/main" xmlns:r="http://schemas.openxmlformats.org/officeDocument/2006/relationships">
+  <p:cSld>
+    <p:spTree>
+      <p:nvGrpSpPr>
+        <p:cNvPr id="1" name=""/>
+        <p:cNvGrpSpPr/>
+        <p:nvPr/>
+      </p:nvGrpSpPr>
+      <p:grpSpPr/>
+      <p:sp>
+        <p:nvSpPr>
+          <p:cNvPr id="2" name="TextBox 1"/>
+          <p:cNvSpPr txBox="1"/>
+          <p:nvPr/>
+        </p:nvSpPr>
+        <p:spPr>
+          <a:xfrm>
+            <a:off x="0" y="0"/>
+            <a:ext cx="9144000" cy="381000"/>
+          </a:xfrm>
+          <a:prstGeom prst="rect">
+            <a:avLst/>
+          </a:prstGeom>
+          <a:solidFill>
+            <a:srgbClr val="000000"/>
+          </a:solidFill>
+        </p:spPr>
+        <p:txBody>
+          <a:bodyPr wrap="square">
+            <a:spAutoFit/>
+          </a:bodyPr>
+          <a:lstStyle/>
+          <a:p>
+            <a:pPr>
+              <a:defRPr sz="2000">
+                <a:solidFill>
+                  <a:srgbClr val="FFFFFF"/>
+                </a:solidFill>
+                <a:latin typeface="Calibri"/>
+              </a:defRPr>
+            </a:pPr>
+            <a:r>
+              <a:t>CAT VERY FRIENDLY GUIDE</a:t>
+            </a:r>
+          </a:p>
+        </p:txBody>
+      </p:sp>
+      <p:sp>
+        <p:nvSpPr>
+          <p:cNvPr id="3" name="TextBox 2"/>
+          <p:cNvSpPr txBox="1"/>
+          <p:nvPr/>
+        </p:nvSpPr>
+        <p:spPr>
+          <a:xfrm>
+            <a:off x="914400" y="1143000"/>
+            <a:ext cx="7315200" cy="0"/>
+          </a:xfrm>
+          <a:prstGeom prst="rect">
+            <a:avLst/>
+          </a:prstGeom>
+          <a:noFill/>
+        </p:spPr>
+        <p:txBody>
+          <a:bodyPr wrap="square">
+            <a:spAutoFit/>
+          </a:bodyPr>
+          <a:lstStyle/>
+          <a:p/>
+          <a:p>
+            <a:pPr>
+              <a:spcAft>
+                <a:spcPts val="1800"/>
+              </a:spcAft>
+              <a:defRPr sz="1800">
+                <a:latin typeface="Calibri"/>
+              </a:defRPr>
+            </a:pPr>
+            <a:r>
+              <a:t>Conclusion Getting used to the new environment is not easy, but you can help your cat by being present for her and realizing her needs.  Show your cat that there is no need to be afraid and then she will gradually adapt to the new environment.</a:t>
             </a:r>
           </a:p>
         </p:txBody>
@@ -3194,11 +3383,11 @@
                 <a:solidFill>
                   <a:srgbClr val="FFFFFF"/>
                 </a:solidFill>
-                <a:latin typeface="Inter"/>
+                <a:latin typeface="Calibri"/>
               </a:defRPr>
             </a:pPr>
             <a:r>
-              <a:t>PyPI Installation Guide</a:t>
+              <a:t>CAT VERY FRIENDLY GUIDE</a:t>
             </a:r>
           </a:p>
         </p:txBody>
@@ -3225,32 +3414,21 @@
           </a:bodyPr>
           <a:lstStyle/>
           <a:p/>
-        </p:txBody>
-      </p:sp>
-      <p:pic>
-        <p:nvPicPr>
-          <p:cNvPr id="4" name="Picture 3" descr="Image22.84.jpg"/>
-          <p:cNvPicPr>
-            <a:picLocks noChangeAspect="1"/>
-          </p:cNvPicPr>
-          <p:nvPr/>
-        </p:nvPicPr>
-        <p:blipFill>
-          <a:blip r:embed="rId2"/>
-          <a:stretch>
-            <a:fillRect/>
-          </a:stretch>
-        </p:blipFill>
-        <p:spPr>
-          <a:xfrm>
-            <a:off x="2286000" y="1714500"/>
-            <a:ext cx="5152869" cy="3429000"/>
-          </a:xfrm>
-          <a:prstGeom prst="rect">
-            <a:avLst/>
-          </a:prstGeom>
-        </p:spPr>
-      </p:pic>
+          <a:p>
+            <a:pPr>
+              <a:spcAft>
+                <a:spcPts val="1800"/>
+              </a:spcAft>
+              <a:defRPr sz="1800">
+                <a:latin typeface="Calibri"/>
+              </a:defRPr>
+            </a:pPr>
+            <a:r>
+              <a:t>Make Your Cat Get Used To A New Environment</a:t>
+            </a:r>
+          </a:p>
+        </p:txBody>
+      </p:sp>
     </p:spTree>
   </p:cSld>
   <p:clrMapOvr>
@@ -3298,11 +3476,11 @@
                 <a:solidFill>
                   <a:srgbClr val="FFFFFF"/>
                 </a:solidFill>
-                <a:latin typeface="Inter"/>
+                <a:latin typeface="Calibri"/>
               </a:defRPr>
             </a:pPr>
             <a:r>
-              <a:t>PyPI Installation Guide</a:t>
+              <a:t>CAT VERY FRIENDLY GUIDE</a:t>
             </a:r>
           </a:p>
         </p:txBody>
@@ -3333,7 +3511,7 @@
       </p:sp>
       <p:pic>
         <p:nvPicPr>
-          <p:cNvPr id="4" name="Picture 3" descr="Image22.84.jpg"/>
+          <p:cNvPr id="4" name="Picture 3" descr="Image21.jpg"/>
           <p:cNvPicPr>
             <a:picLocks noChangeAspect="1"/>
           </p:cNvPicPr>
@@ -3348,7 +3526,7 @@
         <p:spPr>
           <a:xfrm>
             <a:off x="2286000" y="1714500"/>
-            <a:ext cx="5152869" cy="3429000"/>
+            <a:ext cx="5486400" cy="3429000"/>
           </a:xfrm>
           <a:prstGeom prst="rect">
             <a:avLst/>
@@ -3402,11 +3580,11 @@
                 <a:solidFill>
                   <a:srgbClr val="FFFFFF"/>
                 </a:solidFill>
-                <a:latin typeface="Inter"/>
+                <a:latin typeface="Calibri"/>
               </a:defRPr>
             </a:pPr>
             <a:r>
-              <a:t>PyPI Installation Guide</a:t>
+              <a:t>CAT VERY FRIENDLY GUIDE</a:t>
             </a:r>
           </a:p>
         </p:txBody>
@@ -3433,32 +3611,21 @@
           </a:bodyPr>
           <a:lstStyle/>
           <a:p/>
-        </p:txBody>
-      </p:sp>
-      <p:pic>
-        <p:nvPicPr>
-          <p:cNvPr id="4" name="Picture 3" descr="Image22.84.jpg"/>
-          <p:cNvPicPr>
-            <a:picLocks noChangeAspect="1"/>
-          </p:cNvPicPr>
-          <p:nvPr/>
-        </p:nvPicPr>
-        <p:blipFill>
-          <a:blip r:embed="rId2"/>
-          <a:stretch>
-            <a:fillRect/>
-          </a:stretch>
-        </p:blipFill>
-        <p:spPr>
-          <a:xfrm>
-            <a:off x="2286000" y="1714500"/>
-            <a:ext cx="5152869" cy="3429000"/>
-          </a:xfrm>
-          <a:prstGeom prst="rect">
-            <a:avLst/>
-          </a:prstGeom>
-        </p:spPr>
-      </p:pic>
+          <a:p>
+            <a:pPr>
+              <a:spcAft>
+                <a:spcPts val="1800"/>
+              </a:spcAft>
+              <a:defRPr sz="1800">
+                <a:latin typeface="Calibri"/>
+              </a:defRPr>
+            </a:pPr>
+            <a:r>
+              <a:t>Cats are territorial animals and are not known for their affinity for change.  Cats like to spend their days in a family environment and are not good with new routines.  Cats don’t like moving to new places, but humans have to, so they have to move with us.  However, we can take certain steps to reduce cats’ stress and help them adapt to a new environment.  If you want to know how to get the cat used to the new environment, read the points below.</a:t>
+            </a:r>
+          </a:p>
+        </p:txBody>
+      </p:sp>
     </p:spTree>
   </p:cSld>
   <p:clrMapOvr>
@@ -3506,11 +3673,11 @@
                 <a:solidFill>
                   <a:srgbClr val="FFFFFF"/>
                 </a:solidFill>
-                <a:latin typeface="Inter"/>
+                <a:latin typeface="Calibri"/>
               </a:defRPr>
             </a:pPr>
             <a:r>
-              <a:t>PyPI Installation Guide</a:t>
+              <a:t>CAT VERY FRIENDLY GUIDE</a:t>
             </a:r>
           </a:p>
         </p:txBody>
@@ -3537,32 +3704,21 @@
           </a:bodyPr>
           <a:lstStyle/>
           <a:p/>
-        </p:txBody>
-      </p:sp>
-      <p:pic>
-        <p:nvPicPr>
-          <p:cNvPr id="4" name="Picture 3" descr="Image22.84.jpg"/>
-          <p:cNvPicPr>
-            <a:picLocks noChangeAspect="1"/>
-          </p:cNvPicPr>
-          <p:nvPr/>
-        </p:nvPicPr>
-        <p:blipFill>
-          <a:blip r:embed="rId2"/>
-          <a:stretch>
-            <a:fillRect/>
-          </a:stretch>
-        </p:blipFill>
-        <p:spPr>
-          <a:xfrm>
-            <a:off x="2286000" y="1714500"/>
-            <a:ext cx="5152869" cy="3429000"/>
-          </a:xfrm>
-          <a:prstGeom prst="rect">
-            <a:avLst/>
-          </a:prstGeom>
-        </p:spPr>
-      </p:pic>
+          <a:p>
+            <a:pPr>
+              <a:spcAft>
+                <a:spcPts val="1800"/>
+              </a:spcAft>
+              <a:defRPr sz="1800">
+                <a:latin typeface="Calibri"/>
+              </a:defRPr>
+            </a:pPr>
+            <a:r>
+              <a:t>Consider Past Experience Of Your Cat Before doing anything, consider your cat’s past experience.  If your kitten is recently separated from its mother or its littermates, then it is difficult for your kitten to cope with the transition.  But she will adjust there soon.  If your cat is an adult and is separated from its owner and familiar home to bond with a new human companion and a new place than its difficult for her because she has to adapt to a whole new environment again.</a:t>
+            </a:r>
+          </a:p>
+        </p:txBody>
+      </p:sp>
     </p:spTree>
   </p:cSld>
   <p:clrMapOvr>
@@ -3610,11 +3766,11 @@
                 <a:solidFill>
                   <a:srgbClr val="FFFFFF"/>
                 </a:solidFill>
-                <a:latin typeface="Inter"/>
+                <a:latin typeface="Calibri"/>
               </a:defRPr>
             </a:pPr>
             <a:r>
-              <a:t>PyPI Installation Guide</a:t>
+              <a:t>CAT VERY FRIENDLY GUIDE</a:t>
             </a:r>
           </a:p>
         </p:txBody>
@@ -3647,11 +3803,11 @@
                 <a:spcPts val="1800"/>
               </a:spcAft>
               <a:defRPr sz="1800">
-                <a:latin typeface="Inter"/>
+                <a:latin typeface="Calibri"/>
               </a:defRPr>
             </a:pPr>
             <a:r>
-              <a:t>The document is broken down into sections so that readers may easily skips parts of the process they are already familiar with.  All but the final section (Uploading to PyPI), can be undertaken as an exercise to understand Python packaging and test the process, without publishing a package on the formal PyPI distribution. For a more detailed reference on package creation, see the official Python Packaging Authority (PyPA) website.  Note: PyPI should be pronounced “pie P I” to avoid confusion with pypy (a Python implementation).  The package can now be imported in Python scripts.  You may need to run as sudo if you have root privileges, or append --user to install under your home directory (often this will be under $HOME/. local).</a:t>
+              <a:t>Introduction To New Environment When your cat is moved from one home to another, make sure that it is transported on a suitable carrier.  Since cats don’t like to travel, your cat may feel stressed when she gets to her new home.  Try to take cats belonging like blankets and toys with her this will help her adjusting new place.  As soon as you get to a new place, don’t let your cat out right away and make the environment as calm as possible.</a:t>
             </a:r>
           </a:p>
         </p:txBody>
@@ -3703,11 +3859,11 @@
                 <a:solidFill>
                   <a:srgbClr val="FFFFFF"/>
                 </a:solidFill>
-                <a:latin typeface="Inter"/>
+                <a:latin typeface="Calibri"/>
               </a:defRPr>
             </a:pPr>
             <a:r>
-              <a:t>PyPI Installation Guide</a:t>
+              <a:t>CAT VERY FRIENDLY GUIDE</a:t>
             </a:r>
           </a:p>
         </p:txBody>
@@ -3734,32 +3890,21 @@
           </a:bodyPr>
           <a:lstStyle/>
           <a:p/>
-        </p:txBody>
-      </p:sp>
-      <p:pic>
-        <p:nvPicPr>
-          <p:cNvPr id="4" name="Picture 3" descr="Image23.75.jpg"/>
-          <p:cNvPicPr>
-            <a:picLocks noChangeAspect="1"/>
-          </p:cNvPicPr>
-          <p:nvPr/>
-        </p:nvPicPr>
-        <p:blipFill>
-          <a:blip r:embed="rId2"/>
-          <a:stretch>
-            <a:fillRect/>
-          </a:stretch>
-        </p:blipFill>
-        <p:spPr>
-          <a:xfrm>
-            <a:off x="2286000" y="1714500"/>
-            <a:ext cx="5308050" cy="3429000"/>
-          </a:xfrm>
-          <a:prstGeom prst="rect">
-            <a:avLst/>
-          </a:prstGeom>
-        </p:spPr>
-      </p:pic>
+          <a:p>
+            <a:pPr>
+              <a:spcAft>
+                <a:spcPts val="1800"/>
+              </a:spcAft>
+              <a:defRPr sz="1800">
+                <a:latin typeface="Calibri"/>
+              </a:defRPr>
+            </a:pPr>
+            <a:r>
+              <a:t>Clean your home well, especially if you have other pets living in your home.  Cats generally have a very powerful sense of smell and can pick not only the scent of other animals, but they also feel anxiety as a result of which they will increase their stress.  Thoroughly, clean and vacuum every inch of your rugs to remove fur or any other belongings from a different animal.</a:t>
+            </a:r>
+          </a:p>
+        </p:txBody>
+      </p:sp>
     </p:spTree>
   </p:cSld>
   <p:clrMapOvr>
@@ -3807,11 +3952,11 @@
                 <a:solidFill>
                   <a:srgbClr val="FFFFFF"/>
                 </a:solidFill>
-                <a:latin typeface="Inter"/>
+                <a:latin typeface="Calibri"/>
               </a:defRPr>
             </a:pPr>
             <a:r>
-              <a:t>PyPI Installation Guide</a:t>
+              <a:t>CAT VERY FRIENDLY GUIDE</a:t>
             </a:r>
           </a:p>
         </p:txBody>
@@ -3844,11 +3989,117 @@
                 <a:spcPts val="1800"/>
               </a:spcAft>
               <a:defRPr sz="1800">
-                <a:latin typeface="Inter"/>
+                <a:latin typeface="Calibri"/>
               </a:defRPr>
             </a:pPr>
             <a:r>
-              <a:t>Note: pip3 is used to install Python3 packages, however in some environments the command pip may point to pip3, just as python may point to Python3.  You can use which pip to check this.  For this document, examples will show the command simply as pip.</a:t>
+              <a:t>Make Your Cat Get Used To A New Environment If you have other cats in your home, don’t give her their feeding and watering equipment, instead give her new litter box, feeder, and drinker.</a:t>
+            </a:r>
+          </a:p>
+          <a:p>
+            <a:pPr>
+              <a:spcAft>
+                <a:spcPts val="1800"/>
+              </a:spcAft>
+              <a:defRPr sz="1800">
+                <a:latin typeface="Calibri"/>
+              </a:defRPr>
+            </a:pPr>
+            <a:r>
+              <a:t>Adaptation To The New Environment When you bring your cat home, don’t rush the process of giving your cat a tour of the new house.  Instead, create a safe room for your cat and leave it there until you’re ready to start exploring your new home and potentially meeting existing cats.</a:t>
+            </a:r>
+          </a:p>
+        </p:txBody>
+      </p:sp>
+    </p:spTree>
+  </p:cSld>
+  <p:clrMapOvr>
+    <a:masterClrMapping/>
+  </p:clrMapOvr>
+</p:sld>
+</file>
+
+<file path=ppt/slides/slide9.xml><?xml version="1.0" encoding="utf-8"?>
+<p:sld xmlns:a="http://schemas.openxmlformats.org/drawingml/2006/main" xmlns:p="http://schemas.openxmlformats.org/presentationml/2006/main" xmlns:r="http://schemas.openxmlformats.org/officeDocument/2006/relationships">
+  <p:cSld>
+    <p:spTree>
+      <p:nvGrpSpPr>
+        <p:cNvPr id="1" name=""/>
+        <p:cNvGrpSpPr/>
+        <p:nvPr/>
+      </p:nvGrpSpPr>
+      <p:grpSpPr/>
+      <p:sp>
+        <p:nvSpPr>
+          <p:cNvPr id="2" name="TextBox 1"/>
+          <p:cNvSpPr txBox="1"/>
+          <p:nvPr/>
+        </p:nvSpPr>
+        <p:spPr>
+          <a:xfrm>
+            <a:off x="0" y="0"/>
+            <a:ext cx="9144000" cy="381000"/>
+          </a:xfrm>
+          <a:prstGeom prst="rect">
+            <a:avLst/>
+          </a:prstGeom>
+          <a:solidFill>
+            <a:srgbClr val="000000"/>
+          </a:solidFill>
+        </p:spPr>
+        <p:txBody>
+          <a:bodyPr wrap="square">
+            <a:spAutoFit/>
+          </a:bodyPr>
+          <a:lstStyle/>
+          <a:p>
+            <a:pPr>
+              <a:defRPr sz="2000">
+                <a:solidFill>
+                  <a:srgbClr val="FFFFFF"/>
+                </a:solidFill>
+                <a:latin typeface="Calibri"/>
+              </a:defRPr>
+            </a:pPr>
+            <a:r>
+              <a:t>CAT VERY FRIENDLY GUIDE</a:t>
+            </a:r>
+          </a:p>
+        </p:txBody>
+      </p:sp>
+      <p:sp>
+        <p:nvSpPr>
+          <p:cNvPr id="3" name="TextBox 2"/>
+          <p:cNvSpPr txBox="1"/>
+          <p:nvPr/>
+        </p:nvSpPr>
+        <p:spPr>
+          <a:xfrm>
+            <a:off x="914400" y="1143000"/>
+            <a:ext cx="7315200" cy="0"/>
+          </a:xfrm>
+          <a:prstGeom prst="rect">
+            <a:avLst/>
+          </a:prstGeom>
+          <a:noFill/>
+        </p:spPr>
+        <p:txBody>
+          <a:bodyPr wrap="square">
+            <a:spAutoFit/>
+          </a:bodyPr>
+          <a:lstStyle/>
+          <a:p/>
+          <a:p>
+            <a:pPr>
+              <a:spcAft>
+                <a:spcPts val="1800"/>
+              </a:spcAft>
+              <a:defRPr sz="1800">
+                <a:latin typeface="Calibri"/>
+              </a:defRPr>
+            </a:pPr>
+            <a:r>
+              <a:t>Now your cat has arrived in a new home, so give her several weeks to adjust to the new environment.  During this time, keep your cat indoors and make sure all windows and doors are closed because when cats get scared, they jump out of windows.  Some vets recommend keeping your adult cat indoors for a month and new kittens until they are fully developed.  Once your cat has adapted to the new room, you can open the door so that the cat can leave the room, keep the door open so that she can come back whenever she wants.</a:t>
             </a:r>
           </a:p>
         </p:txBody>

</xml_diff>